<commit_message>
fixed some typos in the slide.
</commit_message>
<xml_diff>
--- a/day5-jpa2/EAP7_Training#5 JPA 2.pptx
+++ b/day5-jpa2/EAP7_Training#5 JPA 2.pptx
@@ -1465,17 +1465,17 @@
           </a:prstGeom>
           <a:extLst>
             <a:ext uri="{FAA26D3D-D897-4be2-8F04-BA451C77F1D7}">
-              <ma14:placeholderFlag xmlns:ma14="http://schemas.microsoft.com/office/mac/drawingml/2011/main" xmlns="" val="1"/>
+              <ma14:placeholderFlag xmlns="" xmlns:ma14="http://schemas.microsoft.com/office/mac/drawingml/2011/main" val="1"/>
             </a:ext>
             <a:ext uri="{909E8E84-426E-40dd-AFC4-6F175D3DCCD1}">
-              <a14:hiddenFill xmlns:a14="http://schemas.microsoft.com/office/drawing/2010/main" xmlns="">
+              <a14:hiddenFill xmlns="" xmlns:a14="http://schemas.microsoft.com/office/drawing/2010/main">
                 <a:solidFill>
                   <a:srgbClr val="FFFFFF"/>
                 </a:solidFill>
               </a14:hiddenFill>
             </a:ext>
             <a:ext uri="{91240B29-F687-4f45-9708-019B960494DF}">
-              <a14:hiddenLine xmlns:a14="http://schemas.microsoft.com/office/drawing/2010/main" xmlns="" w="9525">
+              <a14:hiddenLine xmlns="" xmlns:a14="http://schemas.microsoft.com/office/drawing/2010/main" w="9525">
                 <a:solidFill>
                   <a:srgbClr val="000000"/>
                 </a:solidFill>
@@ -1527,17 +1527,17 @@
           </a:ln>
           <a:extLst>
             <a:ext uri="{FAA26D3D-D897-4be2-8F04-BA451C77F1D7}">
-              <ma14:placeholderFlag xmlns:ma14="http://schemas.microsoft.com/office/mac/drawingml/2011/main" xmlns="" val="1"/>
+              <ma14:placeholderFlag xmlns="" xmlns:ma14="http://schemas.microsoft.com/office/mac/drawingml/2011/main" val="1"/>
             </a:ext>
             <a:ext uri="{909E8E84-426E-40dd-AFC4-6F175D3DCCD1}">
-              <a14:hiddenFill xmlns:a14="http://schemas.microsoft.com/office/drawing/2010/main" xmlns="">
+              <a14:hiddenFill xmlns="" xmlns:a14="http://schemas.microsoft.com/office/drawing/2010/main">
                 <a:solidFill>
                   <a:srgbClr val="FFFFFF"/>
                 </a:solidFill>
               </a14:hiddenFill>
             </a:ext>
             <a:ext uri="{91240B29-F687-4f45-9708-019B960494DF}">
-              <a14:hiddenLine xmlns:a14="http://schemas.microsoft.com/office/drawing/2010/main" xmlns="" w="9525">
+              <a14:hiddenLine xmlns="" xmlns:a14="http://schemas.microsoft.com/office/drawing/2010/main" w="9525">
                 <a:solidFill>
                   <a:srgbClr val="000000"/>
                 </a:solidFill>
@@ -7526,7 +7526,7 @@
                   </a:schemeClr>
                 </a:solidFill>
               </a:rPr>
-              <a:t>Inheritance.TABLE_PER_CLASS</a:t>
+              <a:t>InheritanceType.TABLE_PER_CLASS</a:t>
             </a:r>
             <a:br>
               <a:rPr lang="en-US" altLang="ja-JP" sz="1600" dirty="0"/>
@@ -7546,7 +7546,7 @@
                   </a:schemeClr>
                 </a:solidFill>
               </a:rPr>
-              <a:t>Inheritance.JOINED</a:t>
+              <a:t>InheritanceType.JOINED</a:t>
             </a:r>
             <a:br>
               <a:rPr lang="en-US" altLang="ja-JP" sz="1600" dirty="0"/>
@@ -26082,31 +26082,7 @@
                 <a:cs typeface="メイリオ" panose="020B0604030504040204" pitchFamily="50" charset="-128"/>
                 <a:sym typeface="Arial" panose="020B0604020202020204" pitchFamily="34" charset="0"/>
               </a:rPr>
-              <a:t>    </a:t>
-            </a:r>
-            <a:r>
-              <a:rPr lang="en-US" altLang="ja-JP" sz="1400" dirty="0">
-                <a:latin typeface="メイリオ" panose="020B0604030504040204" pitchFamily="50" charset="-128"/>
-                <a:ea typeface="メイリオ" panose="020B0604030504040204" pitchFamily="50" charset="-128"/>
-                <a:cs typeface="メイリオ" panose="020B0604030504040204" pitchFamily="50" charset="-128"/>
-                <a:sym typeface="Arial" panose="020B0604020202020204" pitchFamily="34" charset="0"/>
-              </a:rPr>
-              <a:t>Mobile</a:t>
-            </a:r>
-            <a:r>
-              <a:rPr lang="en-US" altLang="ja-JP" sz="1400" dirty="0">
-                <a:solidFill>
-                  <a:schemeClr val="tx1">
-                    <a:lumMod val="50000"/>
-                    <a:lumOff val="50000"/>
-                  </a:schemeClr>
-                </a:solidFill>
-                <a:latin typeface="メイリオ" panose="020B0604030504040204" pitchFamily="50" charset="-128"/>
-                <a:ea typeface="メイリオ" panose="020B0604030504040204" pitchFamily="50" charset="-128"/>
-                <a:cs typeface="メイリオ" panose="020B0604030504040204" pitchFamily="50" charset="-128"/>
-                <a:sym typeface="Arial" panose="020B0604020202020204" pitchFamily="34" charset="0"/>
-              </a:rPr>
-              <a:t> </a:t>
+              <a:t>    Employee </a:t>
             </a:r>
             <a:r>
               <a:rPr lang="en-US" altLang="ja-JP" sz="1400" dirty="0">
@@ -26118,7 +26094,7 @@
                 <a:cs typeface="メイリオ" panose="020B0604030504040204" pitchFamily="50" charset="-128"/>
                 <a:sym typeface="Arial" panose="020B0604020202020204" pitchFamily="34" charset="0"/>
               </a:rPr>
-              <a:t>mobile</a:t>
+              <a:t>employee</a:t>
             </a:r>
             <a:r>
               <a:rPr lang="en-US" altLang="ja-JP" sz="1400" dirty="0">

</xml_diff>